<commit_message>
update svc dashboard with unit test deployments
</commit_message>
<xml_diff>
--- a/DevopsWorkstream.pptx
+++ b/DevopsWorkstream.pptx
@@ -217,7 +217,7 @@
           <a:p>
             <a:fld id="{03327CA6-12BA-4E25-8D0C-D0BF47BEA956}" type="datetimeFigureOut">
               <a:rPr lang="en-US" smtClean="0"/>
-              <a:t>4/14/2017</a:t>
+              <a:t>4/20/2017</a:t>
             </a:fld>
             <a:endParaRPr lang="en-US"/>
           </a:p>
@@ -382,7 +382,7 @@
           <a:p>
             <a:fld id="{0ADA80A5-7BB0-734F-8C27-B1DC0FB7F823}" type="datetimeFigureOut">
               <a:rPr lang="en-US" smtClean="0"/>
-              <a:t>4/14/2017</a:t>
+              <a:t>4/20/2017</a:t>
             </a:fld>
             <a:endParaRPr lang="en-US"/>
           </a:p>
@@ -13898,7 +13898,6 @@
               <a:rPr lang="en-US" dirty="0"/>
               <a:t>Continuous integration and deployment</a:t>
             </a:r>
-            <a:endParaRPr lang="en-US" dirty="0"/>
           </a:p>
         </p:txBody>
       </p:sp>
@@ -14033,7 +14032,6 @@
               <a:rPr lang="en-US" dirty="0"/>
               <a:t>Level 2 is a nested bullet</a:t>
             </a:r>
-            <a:endParaRPr lang="en-US" dirty="0"/>
           </a:p>
         </p:txBody>
       </p:sp>
@@ -14539,7 +14537,6 @@
               <a:rPr lang="en-US" dirty="0"/>
               <a:t>Scalability and performance</a:t>
             </a:r>
-            <a:endParaRPr lang="en-US" dirty="0"/>
           </a:p>
         </p:txBody>
       </p:sp>
@@ -15083,7 +15080,6 @@
               <a:rPr lang="en-US" dirty="0" smtClean="0"/>
               <a:t>Automate getting the applications up</a:t>
             </a:r>
-            <a:endParaRPr lang="en-US" dirty="0" smtClean="0"/>
           </a:p>
           <a:p>
             <a:pPr lvl="1"/>
@@ -15555,7 +15551,6 @@
               <a:rPr lang="en-US" dirty="0" smtClean="0"/>
               <a:t>Application Health</a:t>
             </a:r>
-            <a:endParaRPr lang="en-US" dirty="0" smtClean="0"/>
           </a:p>
           <a:p>
             <a:pPr lvl="1"/>
@@ -16041,7 +16036,6 @@
               <a:rPr lang="en-US" dirty="0" smtClean="0"/>
               <a:t>Microservice Production-Readiness Dashboard</a:t>
             </a:r>
-            <a:endParaRPr lang="en-US" dirty="0" smtClean="0"/>
           </a:p>
           <a:p>
             <a:pPr lvl="1"/>

</xml_diff>

<commit_message>
adding a demo goals slide
</commit_message>
<xml_diff>
--- a/DevopsWorkstream.pptx
+++ b/DevopsWorkstream.pptx
@@ -7,10 +7,10 @@
     <p:sldMasterId id="2147483820" r:id="rId3"/>
   </p:sldMasterIdLst>
   <p:notesMasterIdLst>
-    <p:notesMasterId r:id="rId17"/>
+    <p:notesMasterId r:id="rId18"/>
   </p:notesMasterIdLst>
   <p:handoutMasterIdLst>
-    <p:handoutMasterId r:id="rId18"/>
+    <p:handoutMasterId r:id="rId19"/>
   </p:handoutMasterIdLst>
   <p:sldIdLst>
     <p:sldId id="683" r:id="rId4"/>
@@ -26,6 +26,7 @@
     <p:sldId id="725" r:id="rId14"/>
     <p:sldId id="727" r:id="rId15"/>
     <p:sldId id="728" r:id="rId16"/>
+    <p:sldId id="730" r:id="rId17"/>
   </p:sldIdLst>
   <p:sldSz cx="12192000" cy="6858000"/>
   <p:notesSz cx="6858000" cy="9144000"/>
@@ -217,7 +218,7 @@
           <a:p>
             <a:fld id="{03327CA6-12BA-4E25-8D0C-D0BF47BEA956}" type="datetimeFigureOut">
               <a:rPr lang="en-US" smtClean="0"/>
-              <a:t>4/20/2017</a:t>
+              <a:t>4/21/2017</a:t>
             </a:fld>
             <a:endParaRPr lang="en-US"/>
           </a:p>
@@ -382,7 +383,7 @@
           <a:p>
             <a:fld id="{0ADA80A5-7BB0-734F-8C27-B1DC0FB7F823}" type="datetimeFigureOut">
               <a:rPr lang="en-US" smtClean="0"/>
-              <a:t>4/20/2017</a:t>
+              <a:t>4/21/2017</a:t>
             </a:fld>
             <a:endParaRPr lang="en-US"/>
           </a:p>
@@ -13314,6 +13315,1264 @@
     <p:extLst>
       <p:ext uri="{BB962C8B-B14F-4D97-AF65-F5344CB8AC3E}">
         <p14:creationId xmlns:p14="http://schemas.microsoft.com/office/powerpoint/2010/main" val="917316670"/>
+      </p:ext>
+    </p:extLst>
+  </p:cSld>
+  <p:clrMapOvr>
+    <a:masterClrMapping/>
+  </p:clrMapOvr>
+  <p:timing>
+    <p:tnLst>
+      <p:par>
+        <p:cTn id="1" dur="indefinite" restart="never" nodeType="tmRoot"/>
+      </p:par>
+    </p:tnLst>
+  </p:timing>
+</p:sld>
+</file>
+
+<file path=ppt/slides/slide14.xml><?xml version="1.0" encoding="utf-8"?>
+<p:sld xmlns:a="http://schemas.openxmlformats.org/drawingml/2006/main" xmlns:r="http://schemas.openxmlformats.org/officeDocument/2006/relationships" xmlns:p="http://schemas.openxmlformats.org/presentationml/2006/main">
+  <p:cSld>
+    <p:spTree>
+      <p:nvGrpSpPr>
+        <p:cNvPr id="1" name=""/>
+        <p:cNvGrpSpPr/>
+        <p:nvPr/>
+      </p:nvGrpSpPr>
+      <p:grpSpPr>
+        <a:xfrm>
+          <a:off x="0" y="0"/>
+          <a:ext cx="0" cy="0"/>
+          <a:chOff x="0" y="0"/>
+          <a:chExt cx="0" cy="0"/>
+        </a:xfrm>
+      </p:grpSpPr>
+      <p:sp>
+        <p:nvSpPr>
+          <p:cNvPr id="2" name="Title 1"/>
+          <p:cNvSpPr>
+            <a:spLocks noGrp="1"/>
+          </p:cNvSpPr>
+          <p:nvPr>
+            <p:ph type="title"/>
+          </p:nvPr>
+        </p:nvSpPr>
+        <p:spPr/>
+        <p:txBody>
+          <a:bodyPr/>
+          <a:lstStyle/>
+          <a:p>
+            <a:r>
+              <a:rPr lang="en-US" dirty="0" smtClean="0"/>
+              <a:t>DevOps </a:t>
+            </a:r>
+            <a:r>
+              <a:rPr lang="en-US" dirty="0" err="1" smtClean="0"/>
+              <a:t>WorkStream</a:t>
+            </a:r>
+            <a:r>
+              <a:rPr lang="en-US" dirty="0" smtClean="0"/>
+              <a:t> </a:t>
+            </a:r>
+            <a:r>
+              <a:rPr lang="en-US" dirty="0" smtClean="0"/>
+              <a:t>Agency Demo: Goals</a:t>
+            </a:r>
+            <a:endParaRPr lang="en-US" dirty="0"/>
+          </a:p>
+        </p:txBody>
+      </p:sp>
+      <p:sp>
+        <p:nvSpPr>
+          <p:cNvPr id="12" name="Slide Number Placeholder 11"/>
+          <p:cNvSpPr>
+            <a:spLocks noGrp="1"/>
+          </p:cNvSpPr>
+          <p:nvPr>
+            <p:ph type="sldNum" sz="quarter" idx="4"/>
+          </p:nvPr>
+        </p:nvSpPr>
+        <p:spPr/>
+        <p:txBody>
+          <a:bodyPr/>
+          <a:lstStyle/>
+          <a:p>
+            <a:fld id="{EACE6E22-E655-5947-A8B4-6F095FBA2C12}" type="slidenum">
+              <a:rPr lang="en-US" smtClean="0"/>
+              <a:pPr/>
+              <a:t>13</a:t>
+            </a:fld>
+            <a:endParaRPr lang="en-US"/>
+          </a:p>
+        </p:txBody>
+      </p:sp>
+      <p:sp>
+        <p:nvSpPr>
+          <p:cNvPr id="10" name="Footer Placeholder 9"/>
+          <p:cNvSpPr>
+            <a:spLocks noGrp="1"/>
+          </p:cNvSpPr>
+          <p:nvPr>
+            <p:ph type="ftr" sz="quarter" idx="3"/>
+          </p:nvPr>
+        </p:nvSpPr>
+        <p:spPr/>
+        <p:txBody>
+          <a:bodyPr/>
+          <a:lstStyle/>
+          <a:p>
+            <a:r>
+              <a:rPr lang="en-US" smtClean="0"/>
+              <a:t>This document is confidential and intended solely for the client to whom it is addressed.</a:t>
+            </a:r>
+            <a:endParaRPr lang="en-US"/>
+          </a:p>
+        </p:txBody>
+      </p:sp>
+      <p:sp>
+        <p:nvSpPr>
+          <p:cNvPr id="11" name="Content Placeholder 2"/>
+          <p:cNvSpPr txBox="1">
+            <a:spLocks/>
+          </p:cNvSpPr>
+          <p:nvPr/>
+        </p:nvSpPr>
+        <p:spPr>
+          <a:xfrm>
+            <a:off x="5815914" y="1598141"/>
+            <a:ext cx="5737654" cy="1602260"/>
+          </a:xfrm>
+          <a:prstGeom prst="rect">
+            <a:avLst/>
+          </a:prstGeom>
+        </p:spPr>
+        <p:txBody>
+          <a:bodyPr vert="horz" lIns="91440" tIns="45720" rIns="91440" bIns="45720" rtlCol="0">
+            <a:normAutofit/>
+          </a:bodyPr>
+          <a:lstStyle>
+            <a:lvl1pPr marL="285750" indent="-285750" algn="l" defTabSz="914400" rtl="0" eaLnBrk="1" latinLnBrk="0" hangingPunct="1">
+              <a:lnSpc>
+                <a:spcPct val="100000"/>
+              </a:lnSpc>
+              <a:spcBef>
+                <a:spcPts val="600"/>
+              </a:spcBef>
+              <a:spcAft>
+                <a:spcPts val="0"/>
+              </a:spcAft>
+              <a:buFont typeface="Arial" charset="0"/>
+              <a:buChar char="•"/>
+              <a:defRPr sz="1400" i="0" kern="1200" baseline="0">
+                <a:solidFill>
+                  <a:schemeClr val="tx1"/>
+                </a:solidFill>
+                <a:latin typeface="Calibri" charset="0"/>
+                <a:ea typeface="Calibri" charset="0"/>
+                <a:cs typeface="Calibri" charset="0"/>
+              </a:defRPr>
+            </a:lvl1pPr>
+            <a:lvl2pPr marL="576263" indent="-279400" algn="l" defTabSz="914400" rtl="0" eaLnBrk="1" latinLnBrk="0" hangingPunct="1">
+              <a:lnSpc>
+                <a:spcPct val="100000"/>
+              </a:lnSpc>
+              <a:spcBef>
+                <a:spcPts val="0"/>
+              </a:spcBef>
+              <a:spcAft>
+                <a:spcPts val="0"/>
+              </a:spcAft>
+              <a:buFont typeface="LucidaGrande" charset="0"/>
+              <a:buChar char="-"/>
+              <a:tabLst/>
+              <a:defRPr sz="1400" i="0" kern="1200" cap="none" spc="0" baseline="0">
+                <a:solidFill>
+                  <a:schemeClr val="tx1"/>
+                </a:solidFill>
+                <a:latin typeface="Calibri" charset="0"/>
+                <a:ea typeface="Calibri" charset="0"/>
+                <a:cs typeface="Calibri" charset="0"/>
+              </a:defRPr>
+            </a:lvl2pPr>
+            <a:lvl3pPr marL="0" indent="0" algn="l" defTabSz="914400" rtl="0" eaLnBrk="1" latinLnBrk="0" hangingPunct="1">
+              <a:lnSpc>
+                <a:spcPct val="100000"/>
+              </a:lnSpc>
+              <a:spcBef>
+                <a:spcPts val="2400"/>
+              </a:spcBef>
+              <a:spcAft>
+                <a:spcPts val="900"/>
+              </a:spcAft>
+              <a:buFont typeface="Arial"/>
+              <a:buNone/>
+              <a:tabLst/>
+              <a:defRPr sz="1200" i="1" kern="1200">
+                <a:solidFill>
+                  <a:schemeClr val="tx1"/>
+                </a:solidFill>
+                <a:latin typeface="Georgia" charset="0"/>
+                <a:ea typeface="Georgia" charset="0"/>
+                <a:cs typeface="Georgia" charset="0"/>
+              </a:defRPr>
+            </a:lvl3pPr>
+            <a:lvl4pPr marL="15875" indent="0" algn="l" defTabSz="914400" rtl="0" eaLnBrk="1" latinLnBrk="0" hangingPunct="1">
+              <a:lnSpc>
+                <a:spcPct val="100000"/>
+              </a:lnSpc>
+              <a:spcBef>
+                <a:spcPts val="2400"/>
+              </a:spcBef>
+              <a:buFont typeface="LucidaGrande" charset="0"/>
+              <a:buNone/>
+              <a:tabLst/>
+              <a:defRPr sz="1400" kern="1200" cap="all" spc="100" baseline="0">
+                <a:solidFill>
+                  <a:schemeClr val="accent2"/>
+                </a:solidFill>
+                <a:latin typeface="Oswald" charset="0"/>
+                <a:ea typeface="Oswald" charset="0"/>
+                <a:cs typeface="Oswald" charset="0"/>
+              </a:defRPr>
+            </a:lvl4pPr>
+            <a:lvl5pPr marL="0" indent="0" algn="l" defTabSz="914400" rtl="0" eaLnBrk="1" latinLnBrk="0" hangingPunct="1">
+              <a:lnSpc>
+                <a:spcPct val="100000"/>
+              </a:lnSpc>
+              <a:spcBef>
+                <a:spcPts val="1200"/>
+              </a:spcBef>
+              <a:buFont typeface="Arial"/>
+              <a:buNone/>
+              <a:tabLst/>
+              <a:defRPr sz="1200" i="1" kern="1200">
+                <a:solidFill>
+                  <a:schemeClr val="tx1"/>
+                </a:solidFill>
+                <a:latin typeface="+mj-lt"/>
+                <a:ea typeface="+mn-ea"/>
+                <a:cs typeface="+mn-cs"/>
+              </a:defRPr>
+            </a:lvl5pPr>
+            <a:lvl6pPr marL="2514600" indent="-228600" algn="l" defTabSz="914400" rtl="0" eaLnBrk="1" latinLnBrk="0" hangingPunct="1">
+              <a:lnSpc>
+                <a:spcPct val="90000"/>
+              </a:lnSpc>
+              <a:spcBef>
+                <a:spcPts val="500"/>
+              </a:spcBef>
+              <a:buFont typeface="Arial"/>
+              <a:buChar char="•"/>
+              <a:defRPr sz="1800" kern="1200">
+                <a:solidFill>
+                  <a:schemeClr val="tx1"/>
+                </a:solidFill>
+                <a:latin typeface="+mn-lt"/>
+                <a:ea typeface="+mn-ea"/>
+                <a:cs typeface="+mn-cs"/>
+              </a:defRPr>
+            </a:lvl6pPr>
+            <a:lvl7pPr marL="2971800" indent="-228600" algn="l" defTabSz="914400" rtl="0" eaLnBrk="1" latinLnBrk="0" hangingPunct="1">
+              <a:lnSpc>
+                <a:spcPct val="90000"/>
+              </a:lnSpc>
+              <a:spcBef>
+                <a:spcPts val="500"/>
+              </a:spcBef>
+              <a:buFont typeface="Arial"/>
+              <a:buChar char="•"/>
+              <a:defRPr sz="1800" kern="1200">
+                <a:solidFill>
+                  <a:schemeClr val="tx1"/>
+                </a:solidFill>
+                <a:latin typeface="+mn-lt"/>
+                <a:ea typeface="+mn-ea"/>
+                <a:cs typeface="+mn-cs"/>
+              </a:defRPr>
+            </a:lvl7pPr>
+            <a:lvl8pPr marL="3429000" indent="-228600" algn="l" defTabSz="914400" rtl="0" eaLnBrk="1" latinLnBrk="0" hangingPunct="1">
+              <a:lnSpc>
+                <a:spcPct val="90000"/>
+              </a:lnSpc>
+              <a:spcBef>
+                <a:spcPts val="500"/>
+              </a:spcBef>
+              <a:buFont typeface="Arial"/>
+              <a:buChar char="•"/>
+              <a:defRPr sz="1800" kern="1200">
+                <a:solidFill>
+                  <a:schemeClr val="tx1"/>
+                </a:solidFill>
+                <a:latin typeface="+mn-lt"/>
+                <a:ea typeface="+mn-ea"/>
+                <a:cs typeface="+mn-cs"/>
+              </a:defRPr>
+            </a:lvl8pPr>
+            <a:lvl9pPr marL="3886200" indent="-228600" algn="l" defTabSz="914400" rtl="0" eaLnBrk="1" latinLnBrk="0" hangingPunct="1">
+              <a:lnSpc>
+                <a:spcPct val="90000"/>
+              </a:lnSpc>
+              <a:spcBef>
+                <a:spcPts val="500"/>
+              </a:spcBef>
+              <a:buFont typeface="Arial"/>
+              <a:buChar char="•"/>
+              <a:defRPr sz="1800" kern="1200">
+                <a:solidFill>
+                  <a:schemeClr val="tx1"/>
+                </a:solidFill>
+                <a:latin typeface="+mn-lt"/>
+                <a:ea typeface="+mn-ea"/>
+                <a:cs typeface="+mn-cs"/>
+              </a:defRPr>
+            </a:lvl9pPr>
+          </a:lstStyle>
+          <a:p>
+            <a:pPr lvl="3"/>
+            <a:r>
+              <a:rPr lang="en-US" dirty="0" smtClean="0"/>
+              <a:t>Developer Support</a:t>
+            </a:r>
+          </a:p>
+          <a:p>
+            <a:r>
+              <a:rPr lang="en-US" dirty="0"/>
+              <a:t>All services configured and deployed in Dev/Test/Pre-Prod</a:t>
+            </a:r>
+          </a:p>
+          <a:p>
+            <a:r>
+              <a:rPr lang="en-US" dirty="0"/>
+              <a:t>Running Kafka Message Broker</a:t>
+            </a:r>
+          </a:p>
+          <a:p>
+            <a:pPr marL="0" indent="0">
+              <a:buNone/>
+            </a:pPr>
+            <a:endParaRPr lang="en-US" dirty="0" smtClean="0"/>
+          </a:p>
+          <a:p>
+            <a:pPr lvl="1"/>
+            <a:endParaRPr lang="en-US" dirty="0" smtClean="0"/>
+          </a:p>
+          <a:p>
+            <a:pPr lvl="1"/>
+            <a:endParaRPr lang="en-US" dirty="0" smtClean="0"/>
+          </a:p>
+          <a:p>
+            <a:pPr lvl="1"/>
+            <a:endParaRPr lang="en-US" dirty="0" smtClean="0"/>
+          </a:p>
+          <a:p>
+            <a:pPr marL="296863" lvl="1" indent="0">
+              <a:buFont typeface="LucidaGrande" charset="0"/>
+              <a:buNone/>
+            </a:pPr>
+            <a:endParaRPr lang="en-US" dirty="0" smtClean="0"/>
+          </a:p>
+          <a:p>
+            <a:pPr marL="296863" lvl="1" indent="0">
+              <a:buFont typeface="LucidaGrande" charset="0"/>
+              <a:buNone/>
+            </a:pPr>
+            <a:endParaRPr lang="en-US" dirty="0" smtClean="0"/>
+          </a:p>
+          <a:p>
+            <a:pPr lvl="3"/>
+            <a:endParaRPr lang="en-US" dirty="0"/>
+          </a:p>
+        </p:txBody>
+      </p:sp>
+      <p:sp>
+        <p:nvSpPr>
+          <p:cNvPr id="13" name="Content Placeholder 2"/>
+          <p:cNvSpPr txBox="1">
+            <a:spLocks/>
+          </p:cNvSpPr>
+          <p:nvPr/>
+        </p:nvSpPr>
+        <p:spPr>
+          <a:xfrm>
+            <a:off x="5815914" y="3200401"/>
+            <a:ext cx="5737654" cy="3120245"/>
+          </a:xfrm>
+          <a:prstGeom prst="rect">
+            <a:avLst/>
+          </a:prstGeom>
+        </p:spPr>
+        <p:txBody>
+          <a:bodyPr vert="horz" lIns="91440" tIns="45720" rIns="91440" bIns="45720" rtlCol="0">
+            <a:normAutofit/>
+          </a:bodyPr>
+          <a:lstStyle>
+            <a:lvl1pPr marL="285750" indent="-285750" algn="l" defTabSz="914400" rtl="0" eaLnBrk="1" latinLnBrk="0" hangingPunct="1">
+              <a:lnSpc>
+                <a:spcPct val="100000"/>
+              </a:lnSpc>
+              <a:spcBef>
+                <a:spcPts val="600"/>
+              </a:spcBef>
+              <a:spcAft>
+                <a:spcPts val="0"/>
+              </a:spcAft>
+              <a:buFont typeface="Arial" charset="0"/>
+              <a:buChar char="•"/>
+              <a:defRPr sz="1400" i="0" kern="1200" baseline="0">
+                <a:solidFill>
+                  <a:schemeClr val="tx1"/>
+                </a:solidFill>
+                <a:latin typeface="Calibri" charset="0"/>
+                <a:ea typeface="Calibri" charset="0"/>
+                <a:cs typeface="Calibri" charset="0"/>
+              </a:defRPr>
+            </a:lvl1pPr>
+            <a:lvl2pPr marL="576263" indent="-279400" algn="l" defTabSz="914400" rtl="0" eaLnBrk="1" latinLnBrk="0" hangingPunct="1">
+              <a:lnSpc>
+                <a:spcPct val="100000"/>
+              </a:lnSpc>
+              <a:spcBef>
+                <a:spcPts val="0"/>
+              </a:spcBef>
+              <a:spcAft>
+                <a:spcPts val="0"/>
+              </a:spcAft>
+              <a:buFont typeface="LucidaGrande" charset="0"/>
+              <a:buChar char="-"/>
+              <a:tabLst/>
+              <a:defRPr sz="1400" i="0" kern="1200" cap="none" spc="0" baseline="0">
+                <a:solidFill>
+                  <a:schemeClr val="tx1"/>
+                </a:solidFill>
+                <a:latin typeface="Calibri" charset="0"/>
+                <a:ea typeface="Calibri" charset="0"/>
+                <a:cs typeface="Calibri" charset="0"/>
+              </a:defRPr>
+            </a:lvl2pPr>
+            <a:lvl3pPr marL="0" indent="0" algn="l" defTabSz="914400" rtl="0" eaLnBrk="1" latinLnBrk="0" hangingPunct="1">
+              <a:lnSpc>
+                <a:spcPct val="100000"/>
+              </a:lnSpc>
+              <a:spcBef>
+                <a:spcPts val="2400"/>
+              </a:spcBef>
+              <a:spcAft>
+                <a:spcPts val="900"/>
+              </a:spcAft>
+              <a:buFont typeface="Arial"/>
+              <a:buNone/>
+              <a:tabLst/>
+              <a:defRPr sz="1200" i="1" kern="1200">
+                <a:solidFill>
+                  <a:schemeClr val="tx1"/>
+                </a:solidFill>
+                <a:latin typeface="Georgia" charset="0"/>
+                <a:ea typeface="Georgia" charset="0"/>
+                <a:cs typeface="Georgia" charset="0"/>
+              </a:defRPr>
+            </a:lvl3pPr>
+            <a:lvl4pPr marL="15875" indent="0" algn="l" defTabSz="914400" rtl="0" eaLnBrk="1" latinLnBrk="0" hangingPunct="1">
+              <a:lnSpc>
+                <a:spcPct val="100000"/>
+              </a:lnSpc>
+              <a:spcBef>
+                <a:spcPts val="2400"/>
+              </a:spcBef>
+              <a:buFont typeface="LucidaGrande" charset="0"/>
+              <a:buNone/>
+              <a:tabLst/>
+              <a:defRPr sz="1400" kern="1200" cap="all" spc="100" baseline="0">
+                <a:solidFill>
+                  <a:schemeClr val="accent2"/>
+                </a:solidFill>
+                <a:latin typeface="Oswald" charset="0"/>
+                <a:ea typeface="Oswald" charset="0"/>
+                <a:cs typeface="Oswald" charset="0"/>
+              </a:defRPr>
+            </a:lvl4pPr>
+            <a:lvl5pPr marL="0" indent="0" algn="l" defTabSz="914400" rtl="0" eaLnBrk="1" latinLnBrk="0" hangingPunct="1">
+              <a:lnSpc>
+                <a:spcPct val="100000"/>
+              </a:lnSpc>
+              <a:spcBef>
+                <a:spcPts val="1200"/>
+              </a:spcBef>
+              <a:buFont typeface="Arial"/>
+              <a:buNone/>
+              <a:tabLst/>
+              <a:defRPr sz="1200" i="1" kern="1200">
+                <a:solidFill>
+                  <a:schemeClr val="tx1"/>
+                </a:solidFill>
+                <a:latin typeface="+mj-lt"/>
+                <a:ea typeface="+mn-ea"/>
+                <a:cs typeface="+mn-cs"/>
+              </a:defRPr>
+            </a:lvl5pPr>
+            <a:lvl6pPr marL="2514600" indent="-228600" algn="l" defTabSz="914400" rtl="0" eaLnBrk="1" latinLnBrk="0" hangingPunct="1">
+              <a:lnSpc>
+                <a:spcPct val="90000"/>
+              </a:lnSpc>
+              <a:spcBef>
+                <a:spcPts val="500"/>
+              </a:spcBef>
+              <a:buFont typeface="Arial"/>
+              <a:buChar char="•"/>
+              <a:defRPr sz="1800" kern="1200">
+                <a:solidFill>
+                  <a:schemeClr val="tx1"/>
+                </a:solidFill>
+                <a:latin typeface="+mn-lt"/>
+                <a:ea typeface="+mn-ea"/>
+                <a:cs typeface="+mn-cs"/>
+              </a:defRPr>
+            </a:lvl6pPr>
+            <a:lvl7pPr marL="2971800" indent="-228600" algn="l" defTabSz="914400" rtl="0" eaLnBrk="1" latinLnBrk="0" hangingPunct="1">
+              <a:lnSpc>
+                <a:spcPct val="90000"/>
+              </a:lnSpc>
+              <a:spcBef>
+                <a:spcPts val="500"/>
+              </a:spcBef>
+              <a:buFont typeface="Arial"/>
+              <a:buChar char="•"/>
+              <a:defRPr sz="1800" kern="1200">
+                <a:solidFill>
+                  <a:schemeClr val="tx1"/>
+                </a:solidFill>
+                <a:latin typeface="+mn-lt"/>
+                <a:ea typeface="+mn-ea"/>
+                <a:cs typeface="+mn-cs"/>
+              </a:defRPr>
+            </a:lvl7pPr>
+            <a:lvl8pPr marL="3429000" indent="-228600" algn="l" defTabSz="914400" rtl="0" eaLnBrk="1" latinLnBrk="0" hangingPunct="1">
+              <a:lnSpc>
+                <a:spcPct val="90000"/>
+              </a:lnSpc>
+              <a:spcBef>
+                <a:spcPts val="500"/>
+              </a:spcBef>
+              <a:buFont typeface="Arial"/>
+              <a:buChar char="•"/>
+              <a:defRPr sz="1800" kern="1200">
+                <a:solidFill>
+                  <a:schemeClr val="tx1"/>
+                </a:solidFill>
+                <a:latin typeface="+mn-lt"/>
+                <a:ea typeface="+mn-ea"/>
+                <a:cs typeface="+mn-cs"/>
+              </a:defRPr>
+            </a:lvl8pPr>
+            <a:lvl9pPr marL="3886200" indent="-228600" algn="l" defTabSz="914400" rtl="0" eaLnBrk="1" latinLnBrk="0" hangingPunct="1">
+              <a:lnSpc>
+                <a:spcPct val="90000"/>
+              </a:lnSpc>
+              <a:spcBef>
+                <a:spcPts val="500"/>
+              </a:spcBef>
+              <a:buFont typeface="Arial"/>
+              <a:buChar char="•"/>
+              <a:defRPr sz="1800" kern="1200">
+                <a:solidFill>
+                  <a:schemeClr val="tx1"/>
+                </a:solidFill>
+                <a:latin typeface="+mn-lt"/>
+                <a:ea typeface="+mn-ea"/>
+                <a:cs typeface="+mn-cs"/>
+              </a:defRPr>
+            </a:lvl9pPr>
+          </a:lstStyle>
+          <a:p>
+            <a:pPr lvl="3"/>
+            <a:r>
+              <a:rPr lang="en-US" dirty="0" err="1" smtClean="0"/>
+              <a:t>Devops</a:t>
+            </a:r>
+            <a:endParaRPr lang="en-US" dirty="0" smtClean="0"/>
+          </a:p>
+          <a:p>
+            <a:r>
+              <a:rPr lang="en-US" dirty="0"/>
+              <a:t>Pipeline Status Dashboards per user Role (in Jenkins)</a:t>
+            </a:r>
+          </a:p>
+          <a:p>
+            <a:r>
+              <a:rPr lang="en-US" dirty="0"/>
+              <a:t>Service Status Dashboard (ELK Stack)</a:t>
+            </a:r>
+          </a:p>
+          <a:p>
+            <a:r>
+              <a:rPr lang="en-US" dirty="0"/>
+              <a:t>Service templates for Spring and </a:t>
+            </a:r>
+            <a:r>
+              <a:rPr lang="en-US" dirty="0" err="1"/>
+              <a:t>NodeJS</a:t>
+            </a:r>
+            <a:r>
+              <a:rPr lang="en-US" dirty="0"/>
+              <a:t>/Angular </a:t>
+            </a:r>
+            <a:r>
+              <a:rPr lang="en-US" dirty="0" smtClean="0"/>
+              <a:t>services</a:t>
+            </a:r>
+          </a:p>
+          <a:p>
+            <a:r>
+              <a:rPr lang="en-US" dirty="0" smtClean="0"/>
+              <a:t> Demo </a:t>
+            </a:r>
+            <a:r>
+              <a:rPr lang="en-US" dirty="0"/>
+              <a:t>creating of a new service)</a:t>
+            </a:r>
+          </a:p>
+          <a:p>
+            <a:r>
+              <a:rPr lang="en-US" dirty="0"/>
+              <a:t>Pipeline Development Status Dashboard</a:t>
+            </a:r>
+          </a:p>
+          <a:p>
+            <a:r>
+              <a:rPr lang="en-US" dirty="0"/>
+              <a:t>Microservice Production Readiness Dashboard</a:t>
+            </a:r>
+            <a:endParaRPr lang="en-US" dirty="0" smtClean="0"/>
+          </a:p>
+          <a:p>
+            <a:pPr lvl="1"/>
+            <a:endParaRPr lang="en-US" dirty="0" smtClean="0"/>
+          </a:p>
+          <a:p>
+            <a:pPr lvl="1"/>
+            <a:endParaRPr lang="en-US" dirty="0" smtClean="0"/>
+          </a:p>
+          <a:p>
+            <a:pPr lvl="1"/>
+            <a:endParaRPr lang="en-US" dirty="0" smtClean="0"/>
+          </a:p>
+          <a:p>
+            <a:pPr marL="296863" lvl="1" indent="0">
+              <a:buFont typeface="LucidaGrande" charset="0"/>
+              <a:buNone/>
+            </a:pPr>
+            <a:endParaRPr lang="en-US" dirty="0" smtClean="0"/>
+          </a:p>
+          <a:p>
+            <a:pPr marL="296863" lvl="1" indent="0">
+              <a:buFont typeface="LucidaGrande" charset="0"/>
+              <a:buNone/>
+            </a:pPr>
+            <a:endParaRPr lang="en-US" dirty="0" smtClean="0"/>
+          </a:p>
+          <a:p>
+            <a:pPr lvl="3"/>
+            <a:endParaRPr lang="en-US" dirty="0"/>
+          </a:p>
+        </p:txBody>
+      </p:sp>
+      <p:sp>
+        <p:nvSpPr>
+          <p:cNvPr id="14" name="Content Placeholder 2"/>
+          <p:cNvSpPr txBox="1">
+            <a:spLocks/>
+          </p:cNvSpPr>
+          <p:nvPr/>
+        </p:nvSpPr>
+        <p:spPr>
+          <a:xfrm>
+            <a:off x="1318054" y="1598141"/>
+            <a:ext cx="4497860" cy="1602260"/>
+          </a:xfrm>
+          <a:prstGeom prst="rect">
+            <a:avLst/>
+          </a:prstGeom>
+        </p:spPr>
+        <p:txBody>
+          <a:bodyPr vert="horz" lIns="91440" tIns="45720" rIns="91440" bIns="45720" rtlCol="0">
+            <a:normAutofit/>
+          </a:bodyPr>
+          <a:lstStyle>
+            <a:lvl1pPr marL="285750" indent="-285750" algn="l" defTabSz="914400" rtl="0" eaLnBrk="1" latinLnBrk="0" hangingPunct="1">
+              <a:lnSpc>
+                <a:spcPct val="100000"/>
+              </a:lnSpc>
+              <a:spcBef>
+                <a:spcPts val="600"/>
+              </a:spcBef>
+              <a:spcAft>
+                <a:spcPts val="0"/>
+              </a:spcAft>
+              <a:buFont typeface="Arial" charset="0"/>
+              <a:buChar char="•"/>
+              <a:defRPr sz="1400" i="0" kern="1200" baseline="0">
+                <a:solidFill>
+                  <a:schemeClr val="tx1"/>
+                </a:solidFill>
+                <a:latin typeface="Calibri" charset="0"/>
+                <a:ea typeface="Calibri" charset="0"/>
+                <a:cs typeface="Calibri" charset="0"/>
+              </a:defRPr>
+            </a:lvl1pPr>
+            <a:lvl2pPr marL="576263" indent="-279400" algn="l" defTabSz="914400" rtl="0" eaLnBrk="1" latinLnBrk="0" hangingPunct="1">
+              <a:lnSpc>
+                <a:spcPct val="100000"/>
+              </a:lnSpc>
+              <a:spcBef>
+                <a:spcPts val="0"/>
+              </a:spcBef>
+              <a:spcAft>
+                <a:spcPts val="0"/>
+              </a:spcAft>
+              <a:buFont typeface="LucidaGrande" charset="0"/>
+              <a:buChar char="-"/>
+              <a:tabLst/>
+              <a:defRPr sz="1400" i="0" kern="1200" cap="none" spc="0" baseline="0">
+                <a:solidFill>
+                  <a:schemeClr val="tx1"/>
+                </a:solidFill>
+                <a:latin typeface="Calibri" charset="0"/>
+                <a:ea typeface="Calibri" charset="0"/>
+                <a:cs typeface="Calibri" charset="0"/>
+              </a:defRPr>
+            </a:lvl2pPr>
+            <a:lvl3pPr marL="0" indent="0" algn="l" defTabSz="914400" rtl="0" eaLnBrk="1" latinLnBrk="0" hangingPunct="1">
+              <a:lnSpc>
+                <a:spcPct val="100000"/>
+              </a:lnSpc>
+              <a:spcBef>
+                <a:spcPts val="2400"/>
+              </a:spcBef>
+              <a:spcAft>
+                <a:spcPts val="900"/>
+              </a:spcAft>
+              <a:buFont typeface="Arial"/>
+              <a:buNone/>
+              <a:tabLst/>
+              <a:defRPr sz="1200" i="1" kern="1200">
+                <a:solidFill>
+                  <a:schemeClr val="tx1"/>
+                </a:solidFill>
+                <a:latin typeface="Georgia" charset="0"/>
+                <a:ea typeface="Georgia" charset="0"/>
+                <a:cs typeface="Georgia" charset="0"/>
+              </a:defRPr>
+            </a:lvl3pPr>
+            <a:lvl4pPr marL="15875" indent="0" algn="l" defTabSz="914400" rtl="0" eaLnBrk="1" latinLnBrk="0" hangingPunct="1">
+              <a:lnSpc>
+                <a:spcPct val="100000"/>
+              </a:lnSpc>
+              <a:spcBef>
+                <a:spcPts val="2400"/>
+              </a:spcBef>
+              <a:buFont typeface="LucidaGrande" charset="0"/>
+              <a:buNone/>
+              <a:tabLst/>
+              <a:defRPr sz="1400" kern="1200" cap="all" spc="100" baseline="0">
+                <a:solidFill>
+                  <a:schemeClr val="accent2"/>
+                </a:solidFill>
+                <a:latin typeface="Oswald" charset="0"/>
+                <a:ea typeface="Oswald" charset="0"/>
+                <a:cs typeface="Oswald" charset="0"/>
+              </a:defRPr>
+            </a:lvl4pPr>
+            <a:lvl5pPr marL="0" indent="0" algn="l" defTabSz="914400" rtl="0" eaLnBrk="1" latinLnBrk="0" hangingPunct="1">
+              <a:lnSpc>
+                <a:spcPct val="100000"/>
+              </a:lnSpc>
+              <a:spcBef>
+                <a:spcPts val="1200"/>
+              </a:spcBef>
+              <a:buFont typeface="Arial"/>
+              <a:buNone/>
+              <a:tabLst/>
+              <a:defRPr sz="1200" i="1" kern="1200">
+                <a:solidFill>
+                  <a:schemeClr val="tx1"/>
+                </a:solidFill>
+                <a:latin typeface="+mj-lt"/>
+                <a:ea typeface="+mn-ea"/>
+                <a:cs typeface="+mn-cs"/>
+              </a:defRPr>
+            </a:lvl5pPr>
+            <a:lvl6pPr marL="2514600" indent="-228600" algn="l" defTabSz="914400" rtl="0" eaLnBrk="1" latinLnBrk="0" hangingPunct="1">
+              <a:lnSpc>
+                <a:spcPct val="90000"/>
+              </a:lnSpc>
+              <a:spcBef>
+                <a:spcPts val="500"/>
+              </a:spcBef>
+              <a:buFont typeface="Arial"/>
+              <a:buChar char="•"/>
+              <a:defRPr sz="1800" kern="1200">
+                <a:solidFill>
+                  <a:schemeClr val="tx1"/>
+                </a:solidFill>
+                <a:latin typeface="+mn-lt"/>
+                <a:ea typeface="+mn-ea"/>
+                <a:cs typeface="+mn-cs"/>
+              </a:defRPr>
+            </a:lvl6pPr>
+            <a:lvl7pPr marL="2971800" indent="-228600" algn="l" defTabSz="914400" rtl="0" eaLnBrk="1" latinLnBrk="0" hangingPunct="1">
+              <a:lnSpc>
+                <a:spcPct val="90000"/>
+              </a:lnSpc>
+              <a:spcBef>
+                <a:spcPts val="500"/>
+              </a:spcBef>
+              <a:buFont typeface="Arial"/>
+              <a:buChar char="•"/>
+              <a:defRPr sz="1800" kern="1200">
+                <a:solidFill>
+                  <a:schemeClr val="tx1"/>
+                </a:solidFill>
+                <a:latin typeface="+mn-lt"/>
+                <a:ea typeface="+mn-ea"/>
+                <a:cs typeface="+mn-cs"/>
+              </a:defRPr>
+            </a:lvl7pPr>
+            <a:lvl8pPr marL="3429000" indent="-228600" algn="l" defTabSz="914400" rtl="0" eaLnBrk="1" latinLnBrk="0" hangingPunct="1">
+              <a:lnSpc>
+                <a:spcPct val="90000"/>
+              </a:lnSpc>
+              <a:spcBef>
+                <a:spcPts val="500"/>
+              </a:spcBef>
+              <a:buFont typeface="Arial"/>
+              <a:buChar char="•"/>
+              <a:defRPr sz="1800" kern="1200">
+                <a:solidFill>
+                  <a:schemeClr val="tx1"/>
+                </a:solidFill>
+                <a:latin typeface="+mn-lt"/>
+                <a:ea typeface="+mn-ea"/>
+                <a:cs typeface="+mn-cs"/>
+              </a:defRPr>
+            </a:lvl8pPr>
+            <a:lvl9pPr marL="3886200" indent="-228600" algn="l" defTabSz="914400" rtl="0" eaLnBrk="1" latinLnBrk="0" hangingPunct="1">
+              <a:lnSpc>
+                <a:spcPct val="90000"/>
+              </a:lnSpc>
+              <a:spcBef>
+                <a:spcPts val="500"/>
+              </a:spcBef>
+              <a:buFont typeface="Arial"/>
+              <a:buChar char="•"/>
+              <a:defRPr sz="1800" kern="1200">
+                <a:solidFill>
+                  <a:schemeClr val="tx1"/>
+                </a:solidFill>
+                <a:latin typeface="+mn-lt"/>
+                <a:ea typeface="+mn-ea"/>
+                <a:cs typeface="+mn-cs"/>
+              </a:defRPr>
+            </a:lvl9pPr>
+          </a:lstStyle>
+          <a:p>
+            <a:pPr lvl="3"/>
+            <a:r>
+              <a:rPr lang="en-US" dirty="0" smtClean="0"/>
+              <a:t>Infrastructure</a:t>
+            </a:r>
+          </a:p>
+          <a:p>
+            <a:r>
+              <a:rPr lang="en-US" dirty="0"/>
+              <a:t>Jenkins Users</a:t>
+            </a:r>
+          </a:p>
+          <a:p>
+            <a:r>
+              <a:rPr lang="en-US" dirty="0" err="1"/>
+              <a:t>OpenShift</a:t>
+            </a:r>
+            <a:r>
+              <a:rPr lang="en-US" dirty="0"/>
+              <a:t> Users</a:t>
+            </a:r>
+          </a:p>
+          <a:p>
+            <a:r>
+              <a:rPr lang="en-US" dirty="0"/>
+              <a:t>ELK Stack for Logging/Monitoring</a:t>
+            </a:r>
+            <a:endParaRPr lang="en-US" dirty="0" smtClean="0"/>
+          </a:p>
+          <a:p>
+            <a:pPr lvl="1"/>
+            <a:endParaRPr lang="en-US" dirty="0" smtClean="0"/>
+          </a:p>
+          <a:p>
+            <a:pPr lvl="1"/>
+            <a:endParaRPr lang="en-US" dirty="0" smtClean="0"/>
+          </a:p>
+          <a:p>
+            <a:pPr lvl="1"/>
+            <a:endParaRPr lang="en-US" dirty="0" smtClean="0"/>
+          </a:p>
+          <a:p>
+            <a:pPr marL="296863" lvl="1" indent="0">
+              <a:buFont typeface="LucidaGrande" charset="0"/>
+              <a:buNone/>
+            </a:pPr>
+            <a:endParaRPr lang="en-US" dirty="0" smtClean="0"/>
+          </a:p>
+          <a:p>
+            <a:pPr marL="296863" lvl="1" indent="0">
+              <a:buFont typeface="LucidaGrande" charset="0"/>
+              <a:buNone/>
+            </a:pPr>
+            <a:endParaRPr lang="en-US" dirty="0" smtClean="0"/>
+          </a:p>
+          <a:p>
+            <a:pPr lvl="3"/>
+            <a:endParaRPr lang="en-US" dirty="0"/>
+          </a:p>
+        </p:txBody>
+      </p:sp>
+      <p:sp>
+        <p:nvSpPr>
+          <p:cNvPr id="15" name="Content Placeholder 2"/>
+          <p:cNvSpPr txBox="1">
+            <a:spLocks/>
+          </p:cNvSpPr>
+          <p:nvPr/>
+        </p:nvSpPr>
+        <p:spPr>
+          <a:xfrm>
+            <a:off x="1318054" y="3200401"/>
+            <a:ext cx="4497860" cy="3120246"/>
+          </a:xfrm>
+          <a:prstGeom prst="rect">
+            <a:avLst/>
+          </a:prstGeom>
+        </p:spPr>
+        <p:txBody>
+          <a:bodyPr vert="horz" lIns="91440" tIns="45720" rIns="91440" bIns="45720" rtlCol="0">
+            <a:normAutofit/>
+          </a:bodyPr>
+          <a:lstStyle>
+            <a:lvl1pPr marL="285750" indent="-285750" algn="l" defTabSz="914400" rtl="0" eaLnBrk="1" latinLnBrk="0" hangingPunct="1">
+              <a:lnSpc>
+                <a:spcPct val="100000"/>
+              </a:lnSpc>
+              <a:spcBef>
+                <a:spcPts val="600"/>
+              </a:spcBef>
+              <a:spcAft>
+                <a:spcPts val="0"/>
+              </a:spcAft>
+              <a:buFont typeface="Arial" charset="0"/>
+              <a:buChar char="•"/>
+              <a:defRPr sz="1400" i="0" kern="1200" baseline="0">
+                <a:solidFill>
+                  <a:schemeClr val="tx1"/>
+                </a:solidFill>
+                <a:latin typeface="Calibri" charset="0"/>
+                <a:ea typeface="Calibri" charset="0"/>
+                <a:cs typeface="Calibri" charset="0"/>
+              </a:defRPr>
+            </a:lvl1pPr>
+            <a:lvl2pPr marL="576263" indent="-279400" algn="l" defTabSz="914400" rtl="0" eaLnBrk="1" latinLnBrk="0" hangingPunct="1">
+              <a:lnSpc>
+                <a:spcPct val="100000"/>
+              </a:lnSpc>
+              <a:spcBef>
+                <a:spcPts val="0"/>
+              </a:spcBef>
+              <a:spcAft>
+                <a:spcPts val="0"/>
+              </a:spcAft>
+              <a:buFont typeface="LucidaGrande" charset="0"/>
+              <a:buChar char="-"/>
+              <a:tabLst/>
+              <a:defRPr sz="1400" i="0" kern="1200" cap="none" spc="0" baseline="0">
+                <a:solidFill>
+                  <a:schemeClr val="tx1"/>
+                </a:solidFill>
+                <a:latin typeface="Calibri" charset="0"/>
+                <a:ea typeface="Calibri" charset="0"/>
+                <a:cs typeface="Calibri" charset="0"/>
+              </a:defRPr>
+            </a:lvl2pPr>
+            <a:lvl3pPr marL="0" indent="0" algn="l" defTabSz="914400" rtl="0" eaLnBrk="1" latinLnBrk="0" hangingPunct="1">
+              <a:lnSpc>
+                <a:spcPct val="100000"/>
+              </a:lnSpc>
+              <a:spcBef>
+                <a:spcPts val="2400"/>
+              </a:spcBef>
+              <a:spcAft>
+                <a:spcPts val="900"/>
+              </a:spcAft>
+              <a:buFont typeface="Arial"/>
+              <a:buNone/>
+              <a:tabLst/>
+              <a:defRPr sz="1200" i="1" kern="1200">
+                <a:solidFill>
+                  <a:schemeClr val="tx1"/>
+                </a:solidFill>
+                <a:latin typeface="Georgia" charset="0"/>
+                <a:ea typeface="Georgia" charset="0"/>
+                <a:cs typeface="Georgia" charset="0"/>
+              </a:defRPr>
+            </a:lvl3pPr>
+            <a:lvl4pPr marL="15875" indent="0" algn="l" defTabSz="914400" rtl="0" eaLnBrk="1" latinLnBrk="0" hangingPunct="1">
+              <a:lnSpc>
+                <a:spcPct val="100000"/>
+              </a:lnSpc>
+              <a:spcBef>
+                <a:spcPts val="2400"/>
+              </a:spcBef>
+              <a:buFont typeface="LucidaGrande" charset="0"/>
+              <a:buNone/>
+              <a:tabLst/>
+              <a:defRPr sz="1400" kern="1200" cap="all" spc="100" baseline="0">
+                <a:solidFill>
+                  <a:schemeClr val="accent2"/>
+                </a:solidFill>
+                <a:latin typeface="Oswald" charset="0"/>
+                <a:ea typeface="Oswald" charset="0"/>
+                <a:cs typeface="Oswald" charset="0"/>
+              </a:defRPr>
+            </a:lvl4pPr>
+            <a:lvl5pPr marL="0" indent="0" algn="l" defTabSz="914400" rtl="0" eaLnBrk="1" latinLnBrk="0" hangingPunct="1">
+              <a:lnSpc>
+                <a:spcPct val="100000"/>
+              </a:lnSpc>
+              <a:spcBef>
+                <a:spcPts val="1200"/>
+              </a:spcBef>
+              <a:buFont typeface="Arial"/>
+              <a:buNone/>
+              <a:tabLst/>
+              <a:defRPr sz="1200" i="1" kern="1200">
+                <a:solidFill>
+                  <a:schemeClr val="tx1"/>
+                </a:solidFill>
+                <a:latin typeface="+mj-lt"/>
+                <a:ea typeface="+mn-ea"/>
+                <a:cs typeface="+mn-cs"/>
+              </a:defRPr>
+            </a:lvl5pPr>
+            <a:lvl6pPr marL="2514600" indent="-228600" algn="l" defTabSz="914400" rtl="0" eaLnBrk="1" latinLnBrk="0" hangingPunct="1">
+              <a:lnSpc>
+                <a:spcPct val="90000"/>
+              </a:lnSpc>
+              <a:spcBef>
+                <a:spcPts val="500"/>
+              </a:spcBef>
+              <a:buFont typeface="Arial"/>
+              <a:buChar char="•"/>
+              <a:defRPr sz="1800" kern="1200">
+                <a:solidFill>
+                  <a:schemeClr val="tx1"/>
+                </a:solidFill>
+                <a:latin typeface="+mn-lt"/>
+                <a:ea typeface="+mn-ea"/>
+                <a:cs typeface="+mn-cs"/>
+              </a:defRPr>
+            </a:lvl6pPr>
+            <a:lvl7pPr marL="2971800" indent="-228600" algn="l" defTabSz="914400" rtl="0" eaLnBrk="1" latinLnBrk="0" hangingPunct="1">
+              <a:lnSpc>
+                <a:spcPct val="90000"/>
+              </a:lnSpc>
+              <a:spcBef>
+                <a:spcPts val="500"/>
+              </a:spcBef>
+              <a:buFont typeface="Arial"/>
+              <a:buChar char="•"/>
+              <a:defRPr sz="1800" kern="1200">
+                <a:solidFill>
+                  <a:schemeClr val="tx1"/>
+                </a:solidFill>
+                <a:latin typeface="+mn-lt"/>
+                <a:ea typeface="+mn-ea"/>
+                <a:cs typeface="+mn-cs"/>
+              </a:defRPr>
+            </a:lvl7pPr>
+            <a:lvl8pPr marL="3429000" indent="-228600" algn="l" defTabSz="914400" rtl="0" eaLnBrk="1" latinLnBrk="0" hangingPunct="1">
+              <a:lnSpc>
+                <a:spcPct val="90000"/>
+              </a:lnSpc>
+              <a:spcBef>
+                <a:spcPts val="500"/>
+              </a:spcBef>
+              <a:buFont typeface="Arial"/>
+              <a:buChar char="•"/>
+              <a:defRPr sz="1800" kern="1200">
+                <a:solidFill>
+                  <a:schemeClr val="tx1"/>
+                </a:solidFill>
+                <a:latin typeface="+mn-lt"/>
+                <a:ea typeface="+mn-ea"/>
+                <a:cs typeface="+mn-cs"/>
+              </a:defRPr>
+            </a:lvl8pPr>
+            <a:lvl9pPr marL="3886200" indent="-228600" algn="l" defTabSz="914400" rtl="0" eaLnBrk="1" latinLnBrk="0" hangingPunct="1">
+              <a:lnSpc>
+                <a:spcPct val="90000"/>
+              </a:lnSpc>
+              <a:spcBef>
+                <a:spcPts val="500"/>
+              </a:spcBef>
+              <a:buFont typeface="Arial"/>
+              <a:buChar char="•"/>
+              <a:defRPr sz="1800" kern="1200">
+                <a:solidFill>
+                  <a:schemeClr val="tx1"/>
+                </a:solidFill>
+                <a:latin typeface="+mn-lt"/>
+                <a:ea typeface="+mn-ea"/>
+                <a:cs typeface="+mn-cs"/>
+              </a:defRPr>
+            </a:lvl9pPr>
+          </a:lstStyle>
+          <a:p>
+            <a:pPr lvl="3"/>
+            <a:r>
+              <a:rPr lang="en-US" dirty="0" smtClean="0"/>
+              <a:t>Pipeline</a:t>
+            </a:r>
+          </a:p>
+          <a:p>
+            <a:r>
+              <a:rPr lang="en-US" dirty="0"/>
+              <a:t>Dev/Test/Pre-Prod Pipeline Deployment</a:t>
+            </a:r>
+          </a:p>
+          <a:p>
+            <a:r>
+              <a:rPr lang="en-US" dirty="0"/>
+              <a:t>Test Stages</a:t>
+            </a:r>
+            <a:r>
+              <a:rPr lang="en-US" dirty="0" smtClean="0"/>
+              <a:t>:</a:t>
+            </a:r>
+          </a:p>
+          <a:p>
+            <a:pPr lvl="1"/>
+            <a:r>
+              <a:rPr lang="en-US" dirty="0" smtClean="0"/>
+              <a:t>Unit</a:t>
+            </a:r>
+          </a:p>
+          <a:p>
+            <a:pPr lvl="1"/>
+            <a:r>
+              <a:rPr lang="en-US" dirty="0" smtClean="0"/>
+              <a:t>Lint</a:t>
+            </a:r>
+          </a:p>
+          <a:p>
+            <a:pPr lvl="1"/>
+            <a:r>
+              <a:rPr lang="en-US" dirty="0" smtClean="0"/>
+              <a:t>Coverage</a:t>
+            </a:r>
+          </a:p>
+          <a:p>
+            <a:pPr lvl="1"/>
+            <a:r>
+              <a:rPr lang="en-US" dirty="0" smtClean="0"/>
+              <a:t>Functional</a:t>
+            </a:r>
+          </a:p>
+          <a:p>
+            <a:pPr lvl="1"/>
+            <a:r>
+              <a:rPr lang="en-US" dirty="0" smtClean="0"/>
+              <a:t>UI </a:t>
+            </a:r>
+            <a:r>
+              <a:rPr lang="en-US" dirty="0"/>
+              <a:t>Tests</a:t>
+            </a:r>
+          </a:p>
+          <a:p>
+            <a:r>
+              <a:rPr lang="en-US" dirty="0"/>
+              <a:t>Security Stages: </a:t>
+            </a:r>
+            <a:endParaRPr lang="en-US" dirty="0" smtClean="0"/>
+          </a:p>
+          <a:p>
+            <a:pPr lvl="1"/>
+            <a:r>
+              <a:rPr lang="en-US" dirty="0" smtClean="0"/>
+              <a:t>Code Scan</a:t>
+            </a:r>
+          </a:p>
+          <a:p>
+            <a:pPr lvl="1"/>
+            <a:r>
+              <a:rPr lang="en-US" dirty="0" smtClean="0"/>
+              <a:t>Container </a:t>
+            </a:r>
+            <a:r>
+              <a:rPr lang="en-US" dirty="0"/>
+              <a:t>Image </a:t>
+            </a:r>
+            <a:r>
+              <a:rPr lang="en-US" dirty="0" smtClean="0"/>
+              <a:t>Scan</a:t>
+            </a:r>
+          </a:p>
+          <a:p>
+            <a:pPr lvl="1"/>
+            <a:r>
+              <a:rPr lang="en-US" dirty="0" smtClean="0"/>
+              <a:t>End </a:t>
+            </a:r>
+            <a:r>
+              <a:rPr lang="en-US" dirty="0"/>
+              <a:t>Point Tests</a:t>
+            </a:r>
+            <a:endParaRPr lang="en-US" dirty="0" smtClean="0"/>
+          </a:p>
+          <a:p>
+            <a:pPr lvl="1"/>
+            <a:endParaRPr lang="en-US" dirty="0" smtClean="0"/>
+          </a:p>
+          <a:p>
+            <a:pPr lvl="1"/>
+            <a:endParaRPr lang="en-US" dirty="0" smtClean="0"/>
+          </a:p>
+          <a:p>
+            <a:pPr lvl="1"/>
+            <a:endParaRPr lang="en-US" dirty="0" smtClean="0"/>
+          </a:p>
+          <a:p>
+            <a:pPr marL="296863" lvl="1" indent="0">
+              <a:buFont typeface="LucidaGrande" charset="0"/>
+              <a:buNone/>
+            </a:pPr>
+            <a:endParaRPr lang="en-US" dirty="0" smtClean="0"/>
+          </a:p>
+          <a:p>
+            <a:pPr marL="296863" lvl="1" indent="0">
+              <a:buFont typeface="LucidaGrande" charset="0"/>
+              <a:buNone/>
+            </a:pPr>
+            <a:endParaRPr lang="en-US" dirty="0" smtClean="0"/>
+          </a:p>
+          <a:p>
+            <a:pPr lvl="3"/>
+            <a:endParaRPr lang="en-US" dirty="0"/>
+          </a:p>
+        </p:txBody>
+      </p:sp>
+    </p:spTree>
+    <p:extLst>
+      <p:ext uri="{BB962C8B-B14F-4D97-AF65-F5344CB8AC3E}">
+        <p14:creationId xmlns:p14="http://schemas.microsoft.com/office/powerpoint/2010/main" val="725870948"/>
       </p:ext>
     </p:extLst>
   </p:cSld>

</xml_diff>